<commit_message>
feat: lesson-8 end - component communication
</commit_message>
<xml_diff>
--- a/slides/08-interactive-components-and-routing.pptx
+++ b/slides/08-interactive-components-and-routing.pptx
@@ -857,7 +857,7 @@
           <a:p>
             <a:fld id="{126DA449-81D0-4C65-80FA-E84926361CC3}" type="datetimeFigureOut">
               <a:rPr lang="en-US" smtClean="0"/>
-              <a:t>4/6/2024</a:t>
+              <a:t>4/8/2024</a:t>
             </a:fld>
             <a:endParaRPr lang="en-US"/>
           </a:p>
@@ -35459,7 +35459,7 @@
                 <a:effectLst/>
                 <a:latin typeface="Consolas" panose="020B0609020204030204" pitchFamily="49" charset="0"/>
               </a:rPr>
-              <a:t>"uppercase“</a:t>
+              <a:t>"uppercase"</a:t>
             </a:r>
           </a:p>
           <a:p>
@@ -44428,14 +44428,14 @@
               <a:t>{</a:t>
             </a:r>
             <a:r>
-              <a:rPr lang="en-US" sz="1100" b="0" dirty="0">
+              <a:rPr lang="en-US" sz="1100" b="0" dirty="0" err="1">
                 <a:solidFill>
                   <a:srgbClr val="4FC1FF"/>
                 </a:solidFill>
                 <a:effectLst/>
                 <a:latin typeface="Consolas" panose="020B0609020204030204" pitchFamily="49" charset="0"/>
               </a:rPr>
-              <a:t>movies</a:t>
+              <a:t>searchQuery</a:t>
             </a:r>
             <a:r>
               <a:rPr lang="en-US" sz="1100" b="0" dirty="0">
@@ -47521,6 +47521,12 @@
 </file>
 
 <file path=customXml/item1.xml><?xml version="1.0" encoding="utf-8"?>
+<p:properties xmlns:p="http://schemas.microsoft.com/office/2006/metadata/properties" xmlns:xsi="http://www.w3.org/2001/XMLSchema-instance" xmlns:pc="http://schemas.microsoft.com/office/infopath/2007/PartnerControls">
+  <documentManagement/>
+</p:properties>
+</file>
+
+<file path=customXml/item2.xml><?xml version="1.0" encoding="utf-8"?>
 <ct:contentTypeSchema xmlns:ct="http://schemas.microsoft.com/office/2006/metadata/contentType" xmlns:ma="http://schemas.microsoft.com/office/2006/metadata/properties/metaAttributes" ct:_="" ma:_="" ma:contentTypeName="Document" ma:contentTypeID="0x010100BA117DE914E1FC49A35D90CD8516D943" ma:contentTypeVersion="12" ma:contentTypeDescription="Create a new document." ma:contentTypeScope="" ma:versionID="e1f7c3316c007ddcbbfc786aee0f30b6">
   <xsd:schema xmlns:xsd="http://www.w3.org/2001/XMLSchema" xmlns:xs="http://www.w3.org/2001/XMLSchema" xmlns:p="http://schemas.microsoft.com/office/2006/metadata/properties" xmlns:ns2="58f349b0-675b-4c01-8ee6-14db8fa12501" xmlns:ns3="df44d29e-ce0d-48fd-88bf-98e6a958fd4b" targetNamespace="http://schemas.microsoft.com/office/2006/metadata/properties" ma:root="true" ma:fieldsID="ebdd3e3611f83f5edb1b485483198b2e" ns2:_="" ns3:_="">
     <xsd:import namespace="58f349b0-675b-4c01-8ee6-14db8fa12501"/>
@@ -47737,12 +47743,6 @@
 </ct:contentTypeSchema>
 </file>
 
-<file path=customXml/item2.xml><?xml version="1.0" encoding="utf-8"?>
-<p:properties xmlns:p="http://schemas.microsoft.com/office/2006/metadata/properties" xmlns:xsi="http://www.w3.org/2001/XMLSchema-instance" xmlns:pc="http://schemas.microsoft.com/office/infopath/2007/PartnerControls">
-  <documentManagement/>
-</p:properties>
-</file>
-
 <file path=customXml/item3.xml><?xml version="1.0" encoding="utf-8"?>
 <?mso-contentType ?>
 <FormTemplates xmlns="http://schemas.microsoft.com/sharepoint/v3/contenttype/forms">
@@ -47753,6 +47753,15 @@
 </file>
 
 <file path=customXml/itemProps1.xml><?xml version="1.0" encoding="utf-8"?>
+<ds:datastoreItem xmlns:ds="http://schemas.openxmlformats.org/officeDocument/2006/customXml" ds:itemID="{412E3419-B313-4514-AD24-D56E1F80A63A}">
+  <ds:schemaRefs>
+    <ds:schemaRef ds:uri="http://schemas.microsoft.com/office/2006/metadata/properties"/>
+    <ds:schemaRef ds:uri="http://schemas.microsoft.com/office/infopath/2007/PartnerControls"/>
+  </ds:schemaRefs>
+</ds:datastoreItem>
+</file>
+
+<file path=customXml/itemProps2.xml><?xml version="1.0" encoding="utf-8"?>
 <ds:datastoreItem xmlns:ds="http://schemas.openxmlformats.org/officeDocument/2006/customXml" ds:itemID="{545DB04F-7584-4690-B257-DA90A69356DD}">
   <ds:schemaRefs>
     <ds:schemaRef ds:uri="58f349b0-675b-4c01-8ee6-14db8fa12501"/>
@@ -47771,15 +47780,6 @@
 </ds:datastoreItem>
 </file>
 
-<file path=customXml/itemProps2.xml><?xml version="1.0" encoding="utf-8"?>
-<ds:datastoreItem xmlns:ds="http://schemas.openxmlformats.org/officeDocument/2006/customXml" ds:itemID="{412E3419-B313-4514-AD24-D56E1F80A63A}">
-  <ds:schemaRefs>
-    <ds:schemaRef ds:uri="http://schemas.microsoft.com/office/2006/metadata/properties"/>
-    <ds:schemaRef ds:uri="http://schemas.microsoft.com/office/infopath/2007/PartnerControls"/>
-  </ds:schemaRefs>
-</ds:datastoreItem>
-</file>
-
 <file path=customXml/itemProps3.xml><?xml version="1.0" encoding="utf-8"?>
 <ds:datastoreItem xmlns:ds="http://schemas.openxmlformats.org/officeDocument/2006/customXml" ds:itemID="{87CA341C-74C1-4577-8C96-EF2605DC526A}">
   <ds:schemaRefs>

</xml_diff>